<commit_message>
verslag eerste tekst align
</commit_message>
<xml_diff>
--- a/SilverSurferVerslag/Verslag demo 6/Klassendiagramma.pptx
+++ b/SilverSurferVerslag/Verslag demo 6/Klassendiagramma.pptx
@@ -303,7 +303,7 @@
           <a:p>
             <a:fld id="{C9E9C0BE-A832-44F7-BFB7-77E7A556107C}" type="datetimeFigureOut">
               <a:rPr lang="nl-BE" smtClean="0"/>
-              <a:t>16/04/2013</a:t>
+              <a:t>23/04/2013</a:t>
             </a:fld>
             <a:endParaRPr lang="nl-BE"/>
           </a:p>
@@ -473,7 +473,7 @@
           <a:p>
             <a:fld id="{C9E9C0BE-A832-44F7-BFB7-77E7A556107C}" type="datetimeFigureOut">
               <a:rPr lang="nl-BE" smtClean="0"/>
-              <a:t>16/04/2013</a:t>
+              <a:t>23/04/2013</a:t>
             </a:fld>
             <a:endParaRPr lang="nl-BE"/>
           </a:p>
@@ -653,7 +653,7 @@
           <a:p>
             <a:fld id="{C9E9C0BE-A832-44F7-BFB7-77E7A556107C}" type="datetimeFigureOut">
               <a:rPr lang="nl-BE" smtClean="0"/>
-              <a:t>16/04/2013</a:t>
+              <a:t>23/04/2013</a:t>
             </a:fld>
             <a:endParaRPr lang="nl-BE"/>
           </a:p>
@@ -823,7 +823,7 @@
           <a:p>
             <a:fld id="{C9E9C0BE-A832-44F7-BFB7-77E7A556107C}" type="datetimeFigureOut">
               <a:rPr lang="nl-BE" smtClean="0"/>
-              <a:t>16/04/2013</a:t>
+              <a:t>23/04/2013</a:t>
             </a:fld>
             <a:endParaRPr lang="nl-BE"/>
           </a:p>
@@ -1069,7 +1069,7 @@
           <a:p>
             <a:fld id="{C9E9C0BE-A832-44F7-BFB7-77E7A556107C}" type="datetimeFigureOut">
               <a:rPr lang="nl-BE" smtClean="0"/>
-              <a:t>16/04/2013</a:t>
+              <a:t>23/04/2013</a:t>
             </a:fld>
             <a:endParaRPr lang="nl-BE"/>
           </a:p>
@@ -1357,7 +1357,7 @@
           <a:p>
             <a:fld id="{C9E9C0BE-A832-44F7-BFB7-77E7A556107C}" type="datetimeFigureOut">
               <a:rPr lang="nl-BE" smtClean="0"/>
-              <a:t>16/04/2013</a:t>
+              <a:t>23/04/2013</a:t>
             </a:fld>
             <a:endParaRPr lang="nl-BE"/>
           </a:p>
@@ -1779,7 +1779,7 @@
           <a:p>
             <a:fld id="{C9E9C0BE-A832-44F7-BFB7-77E7A556107C}" type="datetimeFigureOut">
               <a:rPr lang="nl-BE" smtClean="0"/>
-              <a:t>16/04/2013</a:t>
+              <a:t>23/04/2013</a:t>
             </a:fld>
             <a:endParaRPr lang="nl-BE"/>
           </a:p>
@@ -1897,7 +1897,7 @@
           <a:p>
             <a:fld id="{C9E9C0BE-A832-44F7-BFB7-77E7A556107C}" type="datetimeFigureOut">
               <a:rPr lang="nl-BE" smtClean="0"/>
-              <a:t>16/04/2013</a:t>
+              <a:t>23/04/2013</a:t>
             </a:fld>
             <a:endParaRPr lang="nl-BE"/>
           </a:p>
@@ -1992,7 +1992,7 @@
           <a:p>
             <a:fld id="{C9E9C0BE-A832-44F7-BFB7-77E7A556107C}" type="datetimeFigureOut">
               <a:rPr lang="nl-BE" smtClean="0"/>
-              <a:t>16/04/2013</a:t>
+              <a:t>23/04/2013</a:t>
             </a:fld>
             <a:endParaRPr lang="nl-BE"/>
           </a:p>
@@ -2269,7 +2269,7 @@
           <a:p>
             <a:fld id="{C9E9C0BE-A832-44F7-BFB7-77E7A556107C}" type="datetimeFigureOut">
               <a:rPr lang="nl-BE" smtClean="0"/>
-              <a:t>16/04/2013</a:t>
+              <a:t>23/04/2013</a:t>
             </a:fld>
             <a:endParaRPr lang="nl-BE"/>
           </a:p>
@@ -2522,7 +2522,7 @@
           <a:p>
             <a:fld id="{C9E9C0BE-A832-44F7-BFB7-77E7A556107C}" type="datetimeFigureOut">
               <a:rPr lang="nl-BE" smtClean="0"/>
-              <a:t>16/04/2013</a:t>
+              <a:t>23/04/2013</a:t>
             </a:fld>
             <a:endParaRPr lang="nl-BE"/>
           </a:p>
@@ -2735,7 +2735,7 @@
           <a:p>
             <a:fld id="{C9E9C0BE-A832-44F7-BFB7-77E7A556107C}" type="datetimeFigureOut">
               <a:rPr lang="nl-BE" smtClean="0"/>
-              <a:t>16/04/2013</a:t>
+              <a:t>23/04/2013</a:t>
             </a:fld>
             <a:endParaRPr lang="nl-BE"/>
           </a:p>
@@ -3118,10 +3118,10 @@
         </p:nvGrpSpPr>
         <p:grpSpPr>
           <a:xfrm>
-            <a:off x="299608" y="543256"/>
-            <a:ext cx="8500865" cy="5864615"/>
-            <a:chOff x="342306" y="548680"/>
-            <a:chExt cx="8500865" cy="5864615"/>
+            <a:off x="299606" y="320694"/>
+            <a:ext cx="8500867" cy="6087177"/>
+            <a:chOff x="342304" y="326118"/>
+            <a:chExt cx="8500867" cy="6087177"/>
           </a:xfrm>
         </p:grpSpPr>
         <p:grpSp>
@@ -3132,10 +3132,10 @@
           </p:nvGrpSpPr>
           <p:grpSpPr>
             <a:xfrm>
-              <a:off x="342306" y="548680"/>
-              <a:ext cx="6598970" cy="3718958"/>
-              <a:chOff x="342306" y="548680"/>
-              <a:chExt cx="6598970" cy="3718958"/>
+              <a:off x="342304" y="326118"/>
+              <a:ext cx="6598972" cy="4252108"/>
+              <a:chOff x="342304" y="326118"/>
+              <a:chExt cx="6598972" cy="4252108"/>
             </a:xfrm>
           </p:grpSpPr>
           <p:grpSp>
@@ -3146,10 +3146,10 @@
             </p:nvGrpSpPr>
             <p:grpSpPr>
               <a:xfrm>
-                <a:off x="1151679" y="2565150"/>
-                <a:ext cx="1883093" cy="1410100"/>
-                <a:chOff x="1562187" y="3067253"/>
-                <a:chExt cx="2725094" cy="2573359"/>
+                <a:off x="1151677" y="2342587"/>
+                <a:ext cx="1883094" cy="1943251"/>
+                <a:chOff x="1562185" y="2661087"/>
+                <a:chExt cx="2725094" cy="3546332"/>
               </a:xfrm>
             </p:grpSpPr>
             <p:cxnSp>
@@ -3163,8 +3163,8 @@
               </p:nvCxnSpPr>
               <p:spPr>
                 <a:xfrm rot="5400000">
-                  <a:off x="1667493" y="2961950"/>
-                  <a:ext cx="1127865" cy="1338476"/>
+                  <a:off x="1464411" y="2758867"/>
+                  <a:ext cx="1534029" cy="1338476"/>
                 </a:xfrm>
                 <a:prstGeom prst="bentConnector3">
                   <a:avLst>
@@ -3206,8 +3206,8 @@
               </p:nvCxnSpPr>
               <p:spPr>
                 <a:xfrm rot="16200000" flipH="1">
-                  <a:off x="3030038" y="2937878"/>
-                  <a:ext cx="1127867" cy="1386618"/>
+                  <a:off x="2826955" y="2734795"/>
+                  <a:ext cx="1534031" cy="1386616"/>
                 </a:xfrm>
                 <a:prstGeom prst="bentConnector3">
                   <a:avLst>
@@ -3248,9 +3248,9 @@
                 <p:nvPr/>
               </p:nvCxnSpPr>
               <p:spPr>
-                <a:xfrm>
-                  <a:off x="1562187" y="4728711"/>
-                  <a:ext cx="0" cy="911901"/>
+                <a:xfrm flipH="1">
+                  <a:off x="1562185" y="4728711"/>
+                  <a:ext cx="1" cy="1478708"/>
                 </a:xfrm>
                 <a:prstGeom prst="straightConnector1">
                   <a:avLst/>
@@ -3287,10 +3287,10 @@
             </p:nvGrpSpPr>
             <p:grpSpPr>
               <a:xfrm>
-                <a:off x="342306" y="548680"/>
-                <a:ext cx="6598970" cy="3718958"/>
-                <a:chOff x="390913" y="-612698"/>
-                <a:chExt cx="9549617" cy="6786903"/>
+                <a:off x="342304" y="326118"/>
+                <a:ext cx="6598972" cy="4252108"/>
+                <a:chOff x="390911" y="-1018862"/>
+                <a:chExt cx="9549619" cy="7759875"/>
               </a:xfrm>
             </p:grpSpPr>
             <p:sp>
@@ -3303,8 +3303,8 @@
               </p:nvSpPr>
               <p:spPr>
                 <a:xfrm>
-                  <a:off x="1729391" y="-612698"/>
-                  <a:ext cx="2342547" cy="674012"/>
+                  <a:off x="1729391" y="-1018862"/>
+                  <a:ext cx="2342547" cy="674011"/>
                 </a:xfrm>
                 <a:prstGeom prst="rect">
                   <a:avLst/>
@@ -3352,7 +3352,7 @@
               </p:nvSpPr>
               <p:spPr>
                 <a:xfrm>
-                  <a:off x="1729391" y="1007859"/>
+                  <a:off x="1729391" y="601695"/>
                   <a:ext cx="2342547" cy="533593"/>
                 </a:xfrm>
                 <a:prstGeom prst="rect">
@@ -3396,8 +3396,8 @@
               </p:nvSpPr>
               <p:spPr>
                 <a:xfrm>
-                  <a:off x="390913" y="5640612"/>
-                  <a:ext cx="2342547" cy="533593"/>
+                  <a:off x="390911" y="6207420"/>
+                  <a:ext cx="2342546" cy="533593"/>
                 </a:xfrm>
                 <a:prstGeom prst="rect">
                   <a:avLst/>
@@ -3487,8 +3487,8 @@
               </p:nvSpPr>
               <p:spPr>
                 <a:xfrm>
-                  <a:off x="1729389" y="2533661"/>
-                  <a:ext cx="2342546" cy="533593"/>
+                  <a:off x="1729389" y="2127497"/>
+                  <a:ext cx="2342547" cy="533593"/>
                 </a:xfrm>
                 <a:prstGeom prst="rect">
                   <a:avLst/>
@@ -3534,7 +3534,7 @@
               </p:nvSpPr>
               <p:spPr>
                 <a:xfrm>
-                  <a:off x="7597986" y="2545806"/>
+                  <a:off x="7597986" y="2139642"/>
                   <a:ext cx="2342544" cy="533593"/>
                 </a:xfrm>
                 <a:prstGeom prst="rect">
@@ -3624,9 +3624,9 @@
             </p:nvGrpSpPr>
             <p:grpSpPr>
               <a:xfrm>
-                <a:off x="2076592" y="918012"/>
+                <a:off x="2076592" y="695450"/>
                 <a:ext cx="3245940" cy="1507600"/>
-                <a:chOff x="2900664" y="61313"/>
+                <a:chOff x="2900664" y="-344851"/>
                 <a:chExt cx="4697322" cy="2751290"/>
               </a:xfrm>
             </p:grpSpPr>
@@ -3641,7 +3641,7 @@
               </p:nvCxnSpPr>
               <p:spPr>
                 <a:xfrm flipV="1">
-                  <a:off x="2900665" y="61313"/>
+                  <a:off x="2900665" y="-344851"/>
                   <a:ext cx="0" cy="946545"/>
                 </a:xfrm>
                 <a:prstGeom prst="straightConnector1">
@@ -3678,7 +3678,7 @@
               </p:nvCxnSpPr>
               <p:spPr>
                 <a:xfrm flipV="1">
-                  <a:off x="2900664" y="1541451"/>
+                  <a:off x="2900664" y="1135287"/>
                   <a:ext cx="1" cy="992209"/>
                 </a:xfrm>
                 <a:prstGeom prst="straightConnector1">
@@ -3715,7 +3715,7 @@
               </p:nvCxnSpPr>
               <p:spPr>
                 <a:xfrm flipH="1" flipV="1">
-                  <a:off x="4071934" y="2800458"/>
+                  <a:off x="4071934" y="2394294"/>
                   <a:ext cx="3526052" cy="12145"/>
                 </a:xfrm>
                 <a:prstGeom prst="straightConnector1">
@@ -3751,10 +3751,10 @@
           </p:nvGrpSpPr>
           <p:grpSpPr>
             <a:xfrm>
-              <a:off x="4377113" y="2571805"/>
-              <a:ext cx="4466058" cy="2607362"/>
-              <a:chOff x="4377113" y="2571805"/>
-              <a:chExt cx="4466058" cy="2607362"/>
+              <a:off x="4377113" y="2349243"/>
+              <a:ext cx="4466058" cy="2829924"/>
+              <a:chOff x="4377113" y="2349243"/>
+              <a:chExt cx="4466058" cy="2829924"/>
             </a:xfrm>
           </p:grpSpPr>
           <p:grpSp>
@@ -3765,10 +3765,10 @@
             </p:nvGrpSpPr>
             <p:grpSpPr>
               <a:xfrm>
-                <a:off x="5186484" y="2571805"/>
-                <a:ext cx="2847314" cy="1714032"/>
-                <a:chOff x="5186484" y="2571805"/>
-                <a:chExt cx="2847314" cy="1714032"/>
+                <a:off x="5186485" y="2349243"/>
+                <a:ext cx="2847313" cy="1936594"/>
+                <a:chOff x="5186485" y="2349243"/>
+                <a:chExt cx="2847313" cy="1936594"/>
               </a:xfrm>
             </p:grpSpPr>
             <p:cxnSp>
@@ -3782,8 +3782,8 @@
               </p:nvCxnSpPr>
               <p:spPr>
                 <a:xfrm rot="16200000" flipH="1">
-                  <a:off x="6298927" y="2404781"/>
-                  <a:ext cx="611372" cy="945420"/>
+                  <a:off x="6187647" y="2293500"/>
+                  <a:ext cx="833934" cy="945419"/>
                 </a:xfrm>
                 <a:prstGeom prst="bentConnector3">
                   <a:avLst/>
@@ -3823,8 +3823,8 @@
               </p:nvCxnSpPr>
               <p:spPr>
                 <a:xfrm rot="5400000">
-                  <a:off x="5353508" y="2404783"/>
-                  <a:ext cx="611372" cy="945419"/>
+                  <a:off x="5242228" y="2293500"/>
+                  <a:ext cx="833934" cy="945420"/>
                 </a:xfrm>
                 <a:prstGeom prst="bentConnector3">
                   <a:avLst>
@@ -4544,7 +4544,7 @@
         </p:nvGrpSpPr>
         <p:grpSpPr>
           <a:xfrm>
-            <a:off x="5892386" y="543256"/>
+            <a:off x="5892420" y="320694"/>
             <a:ext cx="2908087" cy="811634"/>
             <a:chOff x="4584585" y="880918"/>
             <a:chExt cx="2908087" cy="811634"/>
@@ -4593,10 +4593,6 @@
                   </a:rPr>
                   <a:t>A</a:t>
                 </a:r>
-                <a:endParaRPr lang="nl-BE" sz="1300" dirty="0">
-                  <a:latin typeface="Times New Roman" pitchFamily="18" charset="0"/>
-                  <a:cs typeface="Times New Roman" pitchFamily="18" charset="0"/>
-                </a:endParaRPr>
               </a:p>
             </p:txBody>
           </p:sp>
@@ -4753,10 +4749,6 @@
                   </a:rPr>
                   <a:t>A</a:t>
                 </a:r>
-                <a:endParaRPr lang="nl-BE" sz="1300" dirty="0">
-                  <a:latin typeface="Times New Roman" pitchFamily="18" charset="0"/>
-                  <a:cs typeface="Times New Roman" pitchFamily="18" charset="0"/>
-                </a:endParaRPr>
               </a:p>
             </p:txBody>
           </p:sp>
@@ -4917,10 +4909,6 @@
                   </a:rPr>
                   <a:t>A</a:t>
                 </a:r>
-                <a:endParaRPr lang="nl-BE" sz="1300" dirty="0">
-                  <a:latin typeface="Times New Roman" pitchFamily="18" charset="0"/>
-                  <a:cs typeface="Times New Roman" pitchFamily="18" charset="0"/>
-                </a:endParaRPr>
               </a:p>
             </p:txBody>
           </p:sp>

</xml_diff>